<commit_message>
finished copy of ux
</commit_message>
<xml_diff>
--- a/Assignment/Real/Design Recommendations.pptx
+++ b/Assignment/Real/Design Recommendations.pptx
@@ -281,7 +281,7 @@
           <a:p>
             <a:fld id="{D4A213A3-10E9-421F-81BE-56E0786AB515}" type="datetime2">
               <a:rPr lang="en-US" smtClean="0"/>
-              <a:t>Thursday, December 8, 2022</a:t>
+              <a:t>Monday, December 19, 2022</a:t>
             </a:fld>
             <a:endParaRPr lang="en-US"/>
           </a:p>
@@ -479,7 +479,7 @@
           <a:p>
             <a:fld id="{3D5DABC0-2199-478F-BA77-33A651B6CB89}" type="datetime2">
               <a:rPr lang="en-US" smtClean="0"/>
-              <a:t>Thursday, December 8, 2022</a:t>
+              <a:t>Monday, December 19, 2022</a:t>
             </a:fld>
             <a:endParaRPr lang="en-US"/>
           </a:p>
@@ -688,7 +688,7 @@
           <a:p>
             <a:fld id="{D72230C6-DF61-47F4-B8C5-1B70E884BF06}" type="datetime2">
               <a:rPr lang="en-US" smtClean="0"/>
-              <a:t>Thursday, December 8, 2022</a:t>
+              <a:t>Monday, December 19, 2022</a:t>
             </a:fld>
             <a:endParaRPr lang="en-US"/>
           </a:p>
@@ -898,7 +898,7 @@
           <a:p>
             <a:fld id="{6B12B50C-7EEE-46CD-BAF7-BBC4026D959A}" type="datetime2">
               <a:rPr lang="en-US" smtClean="0"/>
-              <a:t>Thursday, December 8, 2022</a:t>
+              <a:t>Monday, December 19, 2022</a:t>
             </a:fld>
             <a:endParaRPr lang="en-US"/>
           </a:p>
@@ -1178,7 +1178,7 @@
           <a:p>
             <a:fld id="{8D4211C4-AE09-4254-A5E3-6DA9B099C971}" type="datetime2">
               <a:rPr lang="en-US" smtClean="0"/>
-              <a:t>Thursday, December 8, 2022</a:t>
+              <a:t>Monday, December 19, 2022</a:t>
             </a:fld>
             <a:endParaRPr lang="en-US"/>
           </a:p>
@@ -1457,7 +1457,7 @@
           <a:p>
             <a:fld id="{681742C3-E082-4760-93B2-E209268DD00C}" type="datetime2">
               <a:rPr lang="en-US" smtClean="0"/>
-              <a:t>Thursday, December 8, 2022</a:t>
+              <a:t>Monday, December 19, 2022</a:t>
             </a:fld>
             <a:endParaRPr lang="en-US"/>
           </a:p>
@@ -1878,7 +1878,7 @@
           <a:p>
             <a:fld id="{3B6FC950-F824-48B9-B984-CAEE265865E5}" type="datetime2">
               <a:rPr lang="en-US" smtClean="0"/>
-              <a:t>Thursday, December 8, 2022</a:t>
+              <a:t>Monday, December 19, 2022</a:t>
             </a:fld>
             <a:endParaRPr lang="en-US"/>
           </a:p>
@@ -2031,7 +2031,7 @@
           <a:p>
             <a:fld id="{BC8E3A0F-68E7-4D17-BB84-ED1BA4F6AC6B}" type="datetime2">
               <a:rPr lang="en-US" smtClean="0"/>
-              <a:t>Thursday, December 8, 2022</a:t>
+              <a:t>Monday, December 19, 2022</a:t>
             </a:fld>
             <a:endParaRPr lang="en-US"/>
           </a:p>
@@ -2144,7 +2144,7 @@
           <a:p>
             <a:fld id="{EDB7BC4F-EDA1-4BA2-BFF3-FE5B31CCB58B}" type="datetime2">
               <a:rPr lang="en-US" smtClean="0"/>
-              <a:t>Thursday, December 8, 2022</a:t>
+              <a:t>Monday, December 19, 2022</a:t>
             </a:fld>
             <a:endParaRPr lang="en-US"/>
           </a:p>
@@ -2458,7 +2458,7 @@
           <a:p>
             <a:fld id="{3AAE694C-1394-4838-A564-7380835C2E77}" type="datetime2">
               <a:rPr lang="en-US" smtClean="0"/>
-              <a:t>Thursday, December 8, 2022</a:t>
+              <a:t>Monday, December 19, 2022</a:t>
             </a:fld>
             <a:endParaRPr lang="en-US"/>
           </a:p>
@@ -2751,7 +2751,7 @@
           <a:p>
             <a:fld id="{CAB84B19-1A00-4EDB-8425-E1827A377364}" type="datetime2">
               <a:rPr lang="en-US" smtClean="0"/>
-              <a:t>Thursday, December 8, 2022</a:t>
+              <a:t>Monday, December 19, 2022</a:t>
             </a:fld>
             <a:endParaRPr lang="en-US"/>
           </a:p>
@@ -3120,7 +3120,7 @@
           <a:p>
             <a:fld id="{10076A27-8146-4F75-9851-A83577C6FD8A}" type="datetime2">
               <a:rPr lang="en-US" smtClean="0"/>
-              <a:t>Thursday, December 8, 2022</a:t>
+              <a:t>Monday, December 19, 2022</a:t>
             </a:fld>
             <a:endParaRPr lang="en-US"/>
           </a:p>
@@ -4131,7 +4131,7 @@
         </p:nvSpPr>
         <p:spPr>
           <a:xfrm>
-            <a:off x="1371600" y="1740311"/>
+            <a:off x="1371598" y="1557431"/>
             <a:ext cx="10240903" cy="4330808"/>
           </a:xfrm>
         </p:spPr>
@@ -4469,12 +4469,12 @@
         <p:spPr>
           <a:xfrm>
             <a:off x="975548" y="1358194"/>
-            <a:ext cx="10240903" cy="3956179"/>
+            <a:ext cx="10240903" cy="4814006"/>
           </a:xfrm>
         </p:spPr>
         <p:txBody>
           <a:bodyPr>
-            <a:normAutofit fontScale="85000" lnSpcReduction="10000"/>
+            <a:normAutofit fontScale="32500" lnSpcReduction="20000"/>
           </a:bodyPr>
           <a:lstStyle/>
           <a:p>
@@ -4482,39 +4482,33 @@
               <a:buNone/>
             </a:pPr>
             <a:r>
-              <a:rPr lang="en-GB" dirty="0"/>
+              <a:rPr lang="en-GB" sz="4300" dirty="0"/>
               <a:t>List 3-4 key student attitudes that your interviews and observations revealed. Use typical sound bites from interviews/ specific behaviours observed, to characterise these different attitudes.</a:t>
             </a:r>
           </a:p>
           <a:p>
             <a:r>
-              <a:rPr lang="en-GB" dirty="0"/>
+              <a:rPr lang="en-GB" sz="4300" dirty="0"/>
               <a:t>Finance – many students either had smaller portions, no portions or used the cheapest ingredients they could find, one participant stated, “I would say I’d go with the cheapest option, even if its not healthy as much but just cheapest”, this was quite a similar result for many other participants.</a:t>
             </a:r>
           </a:p>
           <a:p>
             <a:r>
-              <a:rPr lang="en-GB" dirty="0"/>
-              <a:t>Ignorance – many of the participants were unaware of what makes a sustainable meal, the common reason for this was lack of information around now or the inconsistency of information growing up.</a:t>
-            </a:r>
-          </a:p>
-          <a:p>
-            <a:r>
-              <a:rPr lang="en-GB" dirty="0"/>
-              <a:t>Unhealthy eating – there were many instances when a participant would say that the more convenient and typically unhealthy food was cheaper over the healthier food choice by a significant amount.</a:t>
-            </a:r>
-          </a:p>
-          <a:p>
-            <a:r>
-              <a:rPr lang="en-GB" dirty="0"/>
-              <a:t>Sustainability – participants were quick to acknowledge the meaning of sustainability, and some included more specific aspects of it such as food miles and fair trade but weren’t sure how that corresponded to a sustainable food choice.</a:t>
-            </a:r>
-          </a:p>
-          <a:p>
-            <a:pPr marL="0" indent="0">
-              <a:buNone/>
-            </a:pPr>
-            <a:endParaRPr lang="en-GB" dirty="0"/>
+              <a:rPr lang="en-GB" sz="4300" dirty="0"/>
+              <a:t>Ignorance – many of the participants were unaware of what makes a sustainable meal, the common reason for this was lack of information around now or the inconsistency of information growing up, many participants mentioned the “healthy eating plate” but when on to say it became rather irrelevant past primary school.</a:t>
+            </a:r>
+          </a:p>
+          <a:p>
+            <a:r>
+              <a:rPr lang="en-GB" sz="4300" dirty="0"/>
+              <a:t>Unhealthy eating – there were many instances when a participant would say that the more convenient and typically unhealthy food was cheaper over the healthier food choice by a significant amount, “I went through a patch where I was lazy and eating a lot for convenience which didn’t necessarily equal healthy choices”. In addition to this, there were three participants who went through a patch of eating very little to nothing at all, “it was quite bad I would forget to eat or just not eat at all at some points”, this seemed to be a common occurrence within first year university students.</a:t>
+            </a:r>
+          </a:p>
+          <a:p>
+            <a:r>
+              <a:rPr lang="en-GB" sz="4300" dirty="0"/>
+              <a:t>Sustainability – participants were quick to acknowledge the meaning of sustainability, and some included more specific aspects of it such as food miles and fair trade but weren’t sure how that corresponded to a sustainable food choice, “something that can last long, you can maintain it pretty well, I don’t know if that’s a good”. Many of the students seemed confused when answering or a lot of second guessing their answer</a:t>
+            </a:r>
           </a:p>
           <a:p>
             <a:pPr marL="0" indent="0">
@@ -4656,14 +4650,14 @@
           <p:nvPr>
             <p:extLst>
               <p:ext uri="{D42A27DB-BD31-4B8C-83A1-F6EECF244321}">
-                <p14:modId xmlns:p14="http://schemas.microsoft.com/office/powerpoint/2010/main" val="2172869652"/>
+                <p14:modId xmlns:p14="http://schemas.microsoft.com/office/powerpoint/2010/main" val="1455508272"/>
               </p:ext>
             </p:extLst>
           </p:nvPr>
         </p:nvGraphicFramePr>
         <p:xfrm>
           <a:off x="894578" y="2282721"/>
-          <a:ext cx="10731062" cy="3315139"/>
+          <a:ext cx="10731062" cy="3955219"/>
         </p:xfrm>
         <a:graphic>
           <a:graphicData uri="http://schemas.openxmlformats.org/drawingml/2006/table">
@@ -4727,8 +4721,8 @@
                     <a:lstStyle/>
                     <a:p>
                       <a:r>
-                        <a:rPr lang="en-US" dirty="0"/>
-                        <a:t>To be shown multiple food sources</a:t>
+                        <a:rPr lang="en-US" sz="1200" dirty="0"/>
+                        <a:t>Recipes</a:t>
                       </a:r>
                     </a:p>
                   </a:txBody>
@@ -4740,9 +4734,14 @@
                     <a:lstStyle/>
                     <a:p>
                       <a:r>
-                        <a:rPr lang="en-US" dirty="0"/>
-                        <a:t>Create a database of food/drink with a default order of price but can be altered by user</a:t>
+                        <a:rPr lang="en-US" sz="1200" dirty="0"/>
+                        <a:t>Creating a database of recipes for students to use would demonstrate it is affordable as well as simple, it should encourage students to cook in a cheap and sustainable way. One participant said, “I use </a:t>
                       </a:r>
+                      <a:r>
+                        <a:rPr lang="en-GB" sz="1200" dirty="0"/>
+                        <a:t>BBC good food most of the time, they’re also helpful because they list the nutritional value of the meal as well”. If the recipes were included on the app, it would help keep all food related needs in one place rather than scattered between websites.</a:t>
+                      </a:r>
+                      <a:endParaRPr lang="en-US" sz="1200" dirty="0"/>
                     </a:p>
                   </a:txBody>
                   <a:tcPr/>
@@ -4760,8 +4759,8 @@
                     <a:lstStyle/>
                     <a:p>
                       <a:r>
-                        <a:rPr lang="en-US" dirty="0"/>
-                        <a:t>Explanation of food </a:t>
+                        <a:rPr lang="en-US" sz="1200" dirty="0"/>
+                        <a:t>Shop Prices &amp; Budgeting </a:t>
                       </a:r>
                     </a:p>
                   </a:txBody>
@@ -4773,9 +4772,14 @@
                     <a:lstStyle/>
                     <a:p>
                       <a:r>
-                        <a:rPr lang="en-US" dirty="0"/>
-                        <a:t>Make sure students understand the meaning of sustainability and what makes the product/meal sustainable as well as healthy</a:t>
+                        <a:rPr lang="en-US" sz="1200" dirty="0"/>
+                        <a:t>If students had access to a database of shop prices they could budget to their needs and if this was linked to the recipes, they could quickly create a shopping list (possibly incorporating a notes page into the app to keep it all in one place). A key aspect for one participant was, </a:t>
                       </a:r>
+                      <a:r>
+                        <a:rPr lang="en-GB" sz="1200" dirty="0"/>
+                        <a:t>"Affordability, and how I'm able to get it, like how close whatever the food is to me, yeah I would consider that“. This feature would enable students to buy food cheapest and closest to them.</a:t>
+                      </a:r>
+                      <a:endParaRPr lang="en-US" sz="1200" dirty="0"/>
                     </a:p>
                   </a:txBody>
                   <a:tcPr/>
@@ -4793,8 +4797,8 @@
                     <a:lstStyle/>
                     <a:p>
                       <a:r>
-                        <a:rPr lang="en-US" dirty="0"/>
-                        <a:t>User feedback and interaction</a:t>
+                        <a:rPr lang="en-US" sz="1200" dirty="0"/>
+                        <a:t>User Interaction, Communication &amp; Community</a:t>
                       </a:r>
                     </a:p>
                   </a:txBody>
@@ -4806,9 +4810,10 @@
                     <a:lstStyle/>
                     <a:p>
                       <a:r>
-                        <a:rPr lang="en-US" dirty="0"/>
-                        <a:t>Users should be able to review food but also post images of the food they have created – at the end of the week the most popular dish can be advertised to people as a suggestion</a:t>
+                        <a:rPr lang="en-GB" sz="1200" dirty="0"/>
+                        <a:t>“Unless you’re actively looking for it , you won't find anything about it“, this was a statement from one participant and to help find more information it is key that students have the ability to showcase their success as well as learn from one another. This could be displayed through an Instagram like feed which many of the participants stated as their favourite app.</a:t>
                       </a:r>
+                      <a:endParaRPr lang="en-US" sz="1200" dirty="0"/>
                     </a:p>
                   </a:txBody>
                   <a:tcPr/>
@@ -4826,12 +4831,8 @@
                     <a:lstStyle/>
                     <a:p>
                       <a:r>
-                        <a:rPr lang="en-US" dirty="0" err="1"/>
-                        <a:t>Humour</a:t>
-                      </a:r>
-                      <a:r>
-                        <a:rPr lang="en-US" dirty="0"/>
-                        <a:t> </a:t>
+                        <a:rPr lang="en-US" sz="1200" dirty="0"/>
+                        <a:t>Encouragement/Positive reinforcement</a:t>
                       </a:r>
                     </a:p>
                   </a:txBody>
@@ -4843,17 +4844,22 @@
                     <a:lstStyle/>
                     <a:p>
                       <a:r>
-                        <a:rPr lang="en-US" dirty="0"/>
-                        <a:t>A user-on-user interaction such as a forum so people can socialize and create </a:t>
+                        <a:rPr lang="en-US" sz="1200" dirty="0"/>
+                        <a:t>Many of the students I interviewed mentioned aspects of encouragement, they all appreciated when an app gave them a message or little features to show success – this can be seen through the likes feature on Instagram which was a very popular app between the students interviewed. One participant said, “</a:t>
                       </a:r>
                       <a:r>
-                        <a:rPr lang="en-US" dirty="0" err="1"/>
-                        <a:t>humour</a:t>
+                        <a:rPr lang="en-GB" sz="1200" dirty="0"/>
+                        <a:t>I feel good about what I’m eating“, to keep this up a feature of the possible notes list as mentioned in </a:t>
                       </a:r>
                       <a:r>
-                        <a:rPr lang="en-US" dirty="0"/>
-                        <a:t> between one another.</a:t>
+                        <a:rPr lang="en-GB" sz="1200" i="1" dirty="0"/>
+                        <a:t>Shop Prices &amp; Budgeting </a:t>
                       </a:r>
+                      <a:r>
+                        <a:rPr lang="en-GB" sz="1200" i="0" dirty="0"/>
+                        <a:t>is a little golden crown or golden text whenever a sustainable food choice is added to this list.</a:t>
+                      </a:r>
+                      <a:endParaRPr lang="en-US" sz="1200" dirty="0"/>
                     </a:p>
                   </a:txBody>
                   <a:tcPr/>
@@ -4898,6 +4904,51 @@
           <a:chExt cx="0" cy="0"/>
         </a:xfrm>
       </p:grpSpPr>
+      <p:pic>
+        <p:nvPicPr>
+          <p:cNvPr id="1028" name="Picture 4" descr="Shopping List by Orchard Toys | Waterstones">
+            <a:extLst>
+              <a:ext uri="{FF2B5EF4-FFF2-40B4-BE49-F238E27FC236}">
+                <a16:creationId xmlns:a16="http://schemas.microsoft.com/office/drawing/2014/main" id="{C2BA97CB-6D0D-8308-4BB7-0061BC1BCDCD}"/>
+              </a:ext>
+            </a:extLst>
+          </p:cNvPr>
+          <p:cNvPicPr>
+            <a:picLocks noChangeAspect="1" noChangeArrowheads="1"/>
+          </p:cNvPicPr>
+          <p:nvPr/>
+        </p:nvPicPr>
+        <p:blipFill rotWithShape="1">
+          <a:blip r:embed="rId2">
+            <a:extLst>
+              <a:ext uri="{28A0092B-C50C-407E-A947-70E740481C1C}">
+                <a14:useLocalDpi xmlns:a14="http://schemas.microsoft.com/office/drawing/2010/main" val="0"/>
+              </a:ext>
+            </a:extLst>
+          </a:blip>
+          <a:srcRect t="16668" b="15951"/>
+          <a:stretch/>
+        </p:blipFill>
+        <p:spPr bwMode="auto">
+          <a:xfrm rot="20905383">
+            <a:off x="672380" y="4581165"/>
+            <a:ext cx="2235111" cy="1506025"/>
+          </a:xfrm>
+          <a:prstGeom prst="rect">
+            <a:avLst/>
+          </a:prstGeom>
+          <a:noFill/>
+          <a:extLst>
+            <a:ext uri="{909E8E84-426E-40DD-AFC4-6F175D3DCCD1}">
+              <a14:hiddenFill xmlns:a14="http://schemas.microsoft.com/office/drawing/2010/main">
+                <a:solidFill>
+                  <a:srgbClr val="FFFFFF"/>
+                </a:solidFill>
+              </a14:hiddenFill>
+            </a:ext>
+          </a:extLst>
+        </p:spPr>
+      </p:pic>
       <p:sp>
         <p:nvSpPr>
           <p:cNvPr id="2" name="Title 1">
@@ -4970,6 +5021,436 @@
           </a:p>
         </p:txBody>
       </p:sp>
+      <p:pic>
+        <p:nvPicPr>
+          <p:cNvPr id="4" name="Picture 3">
+            <a:extLst>
+              <a:ext uri="{FF2B5EF4-FFF2-40B4-BE49-F238E27FC236}">
+                <a16:creationId xmlns:a16="http://schemas.microsoft.com/office/drawing/2014/main" id="{A32907E0-71BE-4D20-6AC5-3D351CA593A5}"/>
+              </a:ext>
+            </a:extLst>
+          </p:cNvPr>
+          <p:cNvPicPr>
+            <a:picLocks noChangeAspect="1"/>
+          </p:cNvPicPr>
+          <p:nvPr/>
+        </p:nvPicPr>
+        <p:blipFill>
+          <a:blip r:embed="rId3">
+            <a:extLst>
+              <a:ext uri="{BEBA8EAE-BF5A-486C-A8C5-ECC9F3942E4B}">
+                <a14:imgProps xmlns:a14="http://schemas.microsoft.com/office/drawing/2010/main">
+                  <a14:imgLayer r:embed="rId4">
+                    <a14:imgEffect>
+                      <a14:backgroundRemoval t="5078" b="95469" l="9994" r="89944">
+                        <a14:foregroundMark x1="18738" y1="8945" x2="17739" y2="90273"/>
+                        <a14:foregroundMark x1="17739" y1="90273" x2="24788" y2="97253"/>
+                        <a14:foregroundMark x1="25477" y1="97588" x2="38788" y2="91719"/>
+                        <a14:foregroundMark x1="38788" y1="91719" x2="74641" y2="92695"/>
+                        <a14:foregroundMark x1="74641" y1="92695" x2="84510" y2="87617"/>
+                        <a14:foregroundMark x1="84510" y1="87617" x2="81824" y2="23750"/>
+                        <a14:foregroundMark x1="81824" y1="23750" x2="76577" y2="14883"/>
+                        <a14:foregroundMark x1="76577" y1="14883" x2="61212" y2="10117"/>
+                        <a14:foregroundMark x1="61212" y1="10117" x2="49407" y2="12344"/>
+                        <a14:foregroundMark x1="49407" y1="12344" x2="26473" y2="6531"/>
+                        <a14:foregroundMark x1="21140" y1="7269" x2="21299" y2="10938"/>
+                        <a14:foregroundMark x1="22548" y1="13750" x2="42786" y2="16484"/>
+                        <a14:foregroundMark x1="42786" y1="16484" x2="34104" y2="15742"/>
+                        <a14:foregroundMark x1="17052" y1="92383" x2="65397" y2="95195"/>
+                        <a14:foregroundMark x1="65397" y1="95195" x2="77452" y2="94570"/>
+                        <a14:foregroundMark x1="77452" y1="94570" x2="80575" y2="93203"/>
+                        <a14:foregroundMark x1="31543" y1="96016" x2="51156" y2="95469"/>
+                        <a14:foregroundMark x1="51156" y1="95469" x2="56465" y2="95469"/>
+                        <a14:backgroundMark x1="19800" y1="5352" x2="28545" y2="5195"/>
+                        <a14:backgroundMark x1="19800" y1="6914" x2="24047" y2="6406"/>
+                        <a14:backgroundMark x1="25984" y1="6016" x2="19988" y2="5586"/>
+                        <a14:backgroundMark x1="24297" y1="98281" x2="26608" y2="98008"/>
+                        <a14:backgroundMark x1="24485" y1="97734" x2="24922" y2="97344"/>
+                        <a14:backgroundMark x1="24922" y1="97344" x2="23860" y2="98125"/>
+                        <a14:backgroundMark x1="24672" y1="97617" x2="26858" y2="96914"/>
+                        <a14:backgroundMark x1="25984" y1="98125" x2="23423" y2="97617"/>
+                        <a14:backgroundMark x1="23423" y1="97617" x2="23235" y2="97344"/>
+                        <a14:backgroundMark x1="23235" y1="97344" x2="22548" y2="97852"/>
+                      </a14:backgroundRemoval>
+                    </a14:imgEffect>
+                  </a14:imgLayer>
+                </a14:imgProps>
+              </a:ext>
+            </a:extLst>
+          </a:blip>
+          <a:stretch>
+            <a:fillRect/>
+          </a:stretch>
+        </p:blipFill>
+        <p:spPr>
+          <a:xfrm rot="20929260">
+            <a:off x="172290" y="1619203"/>
+            <a:ext cx="1934078" cy="3092592"/>
+          </a:xfrm>
+          <a:prstGeom prst="rect">
+            <a:avLst/>
+          </a:prstGeom>
+        </p:spPr>
+      </p:pic>
+      <p:grpSp>
+        <p:nvGrpSpPr>
+          <p:cNvPr id="8" name="Group 7">
+            <a:extLst>
+              <a:ext uri="{FF2B5EF4-FFF2-40B4-BE49-F238E27FC236}">
+                <a16:creationId xmlns:a16="http://schemas.microsoft.com/office/drawing/2014/main" id="{F8E524EA-D568-1AAB-0831-D2FE8DDCC038}"/>
+              </a:ext>
+            </a:extLst>
+          </p:cNvPr>
+          <p:cNvGrpSpPr/>
+          <p:nvPr/>
+        </p:nvGrpSpPr>
+        <p:grpSpPr>
+          <a:xfrm>
+            <a:off x="2825495" y="1865311"/>
+            <a:ext cx="4711545" cy="1818794"/>
+            <a:chOff x="-579498" y="436302"/>
+            <a:chExt cx="12192000" cy="4743450"/>
+          </a:xfrm>
+        </p:grpSpPr>
+        <p:pic>
+          <p:nvPicPr>
+            <p:cNvPr id="6" name="Picture 5">
+              <a:extLst>
+                <a:ext uri="{FF2B5EF4-FFF2-40B4-BE49-F238E27FC236}">
+                  <a16:creationId xmlns:a16="http://schemas.microsoft.com/office/drawing/2014/main" id="{C09FEF86-A1D6-3F60-5AF3-6DCCDC15256C}"/>
+                </a:ext>
+              </a:extLst>
+            </p:cNvPr>
+            <p:cNvPicPr>
+              <a:picLocks noChangeAspect="1"/>
+            </p:cNvPicPr>
+            <p:nvPr/>
+          </p:nvPicPr>
+          <p:blipFill rotWithShape="1">
+            <a:blip r:embed="rId5"/>
+            <a:srcRect t="20555" b="10277"/>
+            <a:stretch/>
+          </p:blipFill>
+          <p:spPr>
+            <a:xfrm>
+              <a:off x="-579498" y="436302"/>
+              <a:ext cx="12192000" cy="4743450"/>
+            </a:xfrm>
+            <a:prstGeom prst="rect">
+              <a:avLst/>
+            </a:prstGeom>
+          </p:spPr>
+        </p:pic>
+        <p:pic>
+          <p:nvPicPr>
+            <p:cNvPr id="7" name="Picture 6">
+              <a:extLst>
+                <a:ext uri="{FF2B5EF4-FFF2-40B4-BE49-F238E27FC236}">
+                  <a16:creationId xmlns:a16="http://schemas.microsoft.com/office/drawing/2014/main" id="{22BF16F8-2E56-FA17-699B-672A465DF7F3}"/>
+                </a:ext>
+              </a:extLst>
+            </p:cNvPr>
+            <p:cNvPicPr>
+              <a:picLocks noChangeAspect="1"/>
+            </p:cNvPicPr>
+            <p:nvPr/>
+          </p:nvPicPr>
+          <p:blipFill rotWithShape="1">
+            <a:blip r:embed="rId5"/>
+            <a:srcRect l="80066" t="36443" r="2200" b="27194"/>
+            <a:stretch/>
+          </p:blipFill>
+          <p:spPr>
+            <a:xfrm>
+              <a:off x="9361317" y="461820"/>
+              <a:ext cx="2162175" cy="2493702"/>
+            </a:xfrm>
+            <a:prstGeom prst="rect">
+              <a:avLst/>
+            </a:prstGeom>
+          </p:spPr>
+        </p:pic>
+      </p:grpSp>
+      <p:pic>
+        <p:nvPicPr>
+          <p:cNvPr id="1026" name="Picture 2" descr="The Great Big Green Week - Sustainable Food Day - Explore BOA">
+            <a:extLst>
+              <a:ext uri="{FF2B5EF4-FFF2-40B4-BE49-F238E27FC236}">
+                <a16:creationId xmlns:a16="http://schemas.microsoft.com/office/drawing/2014/main" id="{EAFF4160-3C13-5CE8-CE38-3F482661DE1C}"/>
+              </a:ext>
+            </a:extLst>
+          </p:cNvPr>
+          <p:cNvPicPr>
+            <a:picLocks noChangeAspect="1" noChangeArrowheads="1"/>
+          </p:cNvPicPr>
+          <p:nvPr/>
+        </p:nvPicPr>
+        <p:blipFill>
+          <a:blip r:embed="rId6">
+            <a:extLst>
+              <a:ext uri="{28A0092B-C50C-407E-A947-70E740481C1C}">
+                <a14:useLocalDpi xmlns:a14="http://schemas.microsoft.com/office/drawing/2010/main" val="0"/>
+              </a:ext>
+            </a:extLst>
+          </a:blip>
+          <a:srcRect/>
+          <a:stretch>
+            <a:fillRect/>
+          </a:stretch>
+        </p:blipFill>
+        <p:spPr bwMode="auto">
+          <a:xfrm>
+            <a:off x="3291905" y="3785616"/>
+            <a:ext cx="3662231" cy="2322252"/>
+          </a:xfrm>
+          <a:prstGeom prst="rect">
+            <a:avLst/>
+          </a:prstGeom>
+          <a:noFill/>
+          <a:extLst>
+            <a:ext uri="{909E8E84-426E-40DD-AFC4-6F175D3DCCD1}">
+              <a14:hiddenFill xmlns:a14="http://schemas.microsoft.com/office/drawing/2010/main">
+                <a:solidFill>
+                  <a:srgbClr val="FFFFFF"/>
+                </a:solidFill>
+              </a14:hiddenFill>
+            </a:ext>
+          </a:extLst>
+        </p:spPr>
+      </p:pic>
+      <p:pic>
+        <p:nvPicPr>
+          <p:cNvPr id="1030" name="Picture 6" descr="CIMA | Why is Budgeting Important to a Business?">
+            <a:extLst>
+              <a:ext uri="{FF2B5EF4-FFF2-40B4-BE49-F238E27FC236}">
+                <a16:creationId xmlns:a16="http://schemas.microsoft.com/office/drawing/2014/main" id="{F498A39B-416B-7EDA-48BC-24412E78BA71}"/>
+              </a:ext>
+            </a:extLst>
+          </p:cNvPr>
+          <p:cNvPicPr>
+            <a:picLocks noChangeAspect="1" noChangeArrowheads="1"/>
+          </p:cNvPicPr>
+          <p:nvPr/>
+        </p:nvPicPr>
+        <p:blipFill>
+          <a:blip r:embed="rId7">
+            <a:extLst>
+              <a:ext uri="{28A0092B-C50C-407E-A947-70E740481C1C}">
+                <a14:useLocalDpi xmlns:a14="http://schemas.microsoft.com/office/drawing/2010/main" val="0"/>
+              </a:ext>
+            </a:extLst>
+          </a:blip>
+          <a:srcRect/>
+          <a:stretch>
+            <a:fillRect/>
+          </a:stretch>
+        </p:blipFill>
+        <p:spPr bwMode="auto">
+          <a:xfrm>
+            <a:off x="7268615" y="4466775"/>
+            <a:ext cx="2989170" cy="1829372"/>
+          </a:xfrm>
+          <a:prstGeom prst="rect">
+            <a:avLst/>
+          </a:prstGeom>
+          <a:noFill/>
+          <a:extLst>
+            <a:ext uri="{909E8E84-426E-40DD-AFC4-6F175D3DCCD1}">
+              <a14:hiddenFill xmlns:a14="http://schemas.microsoft.com/office/drawing/2010/main">
+                <a:solidFill>
+                  <a:srgbClr val="FFFFFF"/>
+                </a:solidFill>
+              </a14:hiddenFill>
+            </a:ext>
+          </a:extLst>
+        </p:spPr>
+      </p:pic>
+      <p:pic>
+        <p:nvPicPr>
+          <p:cNvPr id="1032" name="Picture 8" descr="300+ Free Encouragement &amp; Like Images - Pixabay">
+            <a:extLst>
+              <a:ext uri="{FF2B5EF4-FFF2-40B4-BE49-F238E27FC236}">
+                <a16:creationId xmlns:a16="http://schemas.microsoft.com/office/drawing/2014/main" id="{064FA352-DB22-DB88-6345-22AFEDFD82A2}"/>
+              </a:ext>
+            </a:extLst>
+          </p:cNvPr>
+          <p:cNvPicPr>
+            <a:picLocks noChangeAspect="1" noChangeArrowheads="1"/>
+          </p:cNvPicPr>
+          <p:nvPr/>
+        </p:nvPicPr>
+        <p:blipFill>
+          <a:blip r:embed="rId8">
+            <a:extLst>
+              <a:ext uri="{28A0092B-C50C-407E-A947-70E740481C1C}">
+                <a14:useLocalDpi xmlns:a14="http://schemas.microsoft.com/office/drawing/2010/main" val="0"/>
+              </a:ext>
+            </a:extLst>
+          </a:blip>
+          <a:srcRect/>
+          <a:stretch>
+            <a:fillRect/>
+          </a:stretch>
+        </p:blipFill>
+        <p:spPr bwMode="auto">
+          <a:xfrm>
+            <a:off x="7796613" y="1881756"/>
+            <a:ext cx="1933175" cy="1216152"/>
+          </a:xfrm>
+          <a:prstGeom prst="rect">
+            <a:avLst/>
+          </a:prstGeom>
+          <a:noFill/>
+          <a:extLst>
+            <a:ext uri="{909E8E84-426E-40DD-AFC4-6F175D3DCCD1}">
+              <a14:hiddenFill xmlns:a14="http://schemas.microsoft.com/office/drawing/2010/main">
+                <a:solidFill>
+                  <a:srgbClr val="FFFFFF"/>
+                </a:solidFill>
+              </a14:hiddenFill>
+            </a:ext>
+          </a:extLst>
+        </p:spPr>
+      </p:pic>
+      <p:pic>
+        <p:nvPicPr>
+          <p:cNvPr id="1034" name="Picture 10" descr="Why do people join communities?. Originally answered Aug 13, 2017 | by Stan  Garfield | Medium">
+            <a:extLst>
+              <a:ext uri="{FF2B5EF4-FFF2-40B4-BE49-F238E27FC236}">
+                <a16:creationId xmlns:a16="http://schemas.microsoft.com/office/drawing/2014/main" id="{B4E70319-AEA3-CC8F-674C-9715E4D1F4D4}"/>
+              </a:ext>
+            </a:extLst>
+          </p:cNvPr>
+          <p:cNvPicPr>
+            <a:picLocks noChangeAspect="1" noChangeArrowheads="1"/>
+          </p:cNvPicPr>
+          <p:nvPr/>
+        </p:nvPicPr>
+        <p:blipFill>
+          <a:blip r:embed="rId9">
+            <a:extLst>
+              <a:ext uri="{28A0092B-C50C-407E-A947-70E740481C1C}">
+                <a14:useLocalDpi xmlns:a14="http://schemas.microsoft.com/office/drawing/2010/main" val="0"/>
+              </a:ext>
+            </a:extLst>
+          </a:blip>
+          <a:srcRect/>
+          <a:stretch>
+            <a:fillRect/>
+          </a:stretch>
+        </p:blipFill>
+        <p:spPr bwMode="auto">
+          <a:xfrm>
+            <a:off x="7780879" y="3096981"/>
+            <a:ext cx="2274376" cy="1118235"/>
+          </a:xfrm>
+          <a:prstGeom prst="rect">
+            <a:avLst/>
+          </a:prstGeom>
+          <a:noFill/>
+          <a:extLst>
+            <a:ext uri="{909E8E84-426E-40DD-AFC4-6F175D3DCCD1}">
+              <a14:hiddenFill xmlns:a14="http://schemas.microsoft.com/office/drawing/2010/main">
+                <a:solidFill>
+                  <a:srgbClr val="FFFFFF"/>
+                </a:solidFill>
+              </a14:hiddenFill>
+            </a:ext>
+          </a:extLst>
+        </p:spPr>
+      </p:pic>
+      <p:pic>
+        <p:nvPicPr>
+          <p:cNvPr id="1036" name="Picture 12" descr="Cost of living: Students struggling with impact of soaring prices - BBC News">
+            <a:extLst>
+              <a:ext uri="{FF2B5EF4-FFF2-40B4-BE49-F238E27FC236}">
+                <a16:creationId xmlns:a16="http://schemas.microsoft.com/office/drawing/2014/main" id="{27AC43F8-5878-0454-9364-EF83B0E61985}"/>
+              </a:ext>
+            </a:extLst>
+          </p:cNvPr>
+          <p:cNvPicPr>
+            <a:picLocks noChangeAspect="1" noChangeArrowheads="1"/>
+          </p:cNvPicPr>
+          <p:nvPr/>
+        </p:nvPicPr>
+        <p:blipFill rotWithShape="1">
+          <a:blip r:embed="rId10">
+            <a:extLst>
+              <a:ext uri="{28A0092B-C50C-407E-A947-70E740481C1C}">
+                <a14:useLocalDpi xmlns:a14="http://schemas.microsoft.com/office/drawing/2010/main" val="0"/>
+              </a:ext>
+            </a:extLst>
+          </a:blip>
+          <a:srcRect l="14819" r="35377"/>
+          <a:stretch/>
+        </p:blipFill>
+        <p:spPr bwMode="auto">
+          <a:xfrm>
+            <a:off x="10057761" y="1836271"/>
+            <a:ext cx="2089091" cy="2359508"/>
+          </a:xfrm>
+          <a:prstGeom prst="rect">
+            <a:avLst/>
+          </a:prstGeom>
+          <a:noFill/>
+          <a:extLst>
+            <a:ext uri="{909E8E84-426E-40DD-AFC4-6F175D3DCCD1}">
+              <a14:hiddenFill xmlns:a14="http://schemas.microsoft.com/office/drawing/2010/main">
+                <a:solidFill>
+                  <a:srgbClr val="FFFFFF"/>
+                </a:solidFill>
+              </a14:hiddenFill>
+            </a:ext>
+          </a:extLst>
+        </p:spPr>
+      </p:pic>
+      <p:pic>
+        <p:nvPicPr>
+          <p:cNvPr id="1040" name="Picture 16" descr="Front">
+            <a:extLst>
+              <a:ext uri="{FF2B5EF4-FFF2-40B4-BE49-F238E27FC236}">
+                <a16:creationId xmlns:a16="http://schemas.microsoft.com/office/drawing/2014/main" id="{24ED2BD0-C75E-1A99-9D2D-99C873674E3F}"/>
+              </a:ext>
+            </a:extLst>
+          </p:cNvPr>
+          <p:cNvPicPr>
+            <a:picLocks noChangeAspect="1" noChangeArrowheads="1"/>
+          </p:cNvPicPr>
+          <p:nvPr/>
+        </p:nvPicPr>
+        <p:blipFill>
+          <a:blip r:embed="rId11">
+            <a:extLst>
+              <a:ext uri="{28A0092B-C50C-407E-A947-70E740481C1C}">
+                <a14:useLocalDpi xmlns:a14="http://schemas.microsoft.com/office/drawing/2010/main" val="0"/>
+              </a:ext>
+            </a:extLst>
+          </a:blip>
+          <a:srcRect/>
+          <a:stretch>
+            <a:fillRect/>
+          </a:stretch>
+        </p:blipFill>
+        <p:spPr bwMode="auto">
+          <a:xfrm>
+            <a:off x="9806038" y="3873245"/>
+            <a:ext cx="2761680" cy="2761680"/>
+          </a:xfrm>
+          <a:prstGeom prst="rect">
+            <a:avLst/>
+          </a:prstGeom>
+          <a:noFill/>
+          <a:extLst>
+            <a:ext uri="{909E8E84-426E-40DD-AFC4-6F175D3DCCD1}">
+              <a14:hiddenFill xmlns:a14="http://schemas.microsoft.com/office/drawing/2010/main">
+                <a:solidFill>
+                  <a:srgbClr val="FFFFFF"/>
+                </a:solidFill>
+              </a14:hiddenFill>
+            </a:ext>
+          </a:extLst>
+        </p:spPr>
+      </p:pic>
     </p:spTree>
     <p:extLst>
       <p:ext uri="{BB962C8B-B14F-4D97-AF65-F5344CB8AC3E}">
@@ -5018,7 +5499,7 @@
         </p:nvSpPr>
         <p:spPr>
           <a:xfrm>
-            <a:off x="1371599" y="561853"/>
+            <a:off x="1371599" y="314965"/>
             <a:ext cx="10240903" cy="646837"/>
           </a:xfrm>
         </p:spPr>
@@ -5054,7 +5535,7 @@
         </p:nvSpPr>
         <p:spPr>
           <a:xfrm>
-            <a:off x="1150883" y="1209378"/>
+            <a:off x="1150883" y="961802"/>
             <a:ext cx="10240903" cy="646837"/>
           </a:xfrm>
         </p:spPr>
@@ -5097,14 +5578,14 @@
           <p:nvPr>
             <p:extLst>
               <p:ext uri="{D42A27DB-BD31-4B8C-83A1-F6EECF244321}">
-                <p14:modId xmlns:p14="http://schemas.microsoft.com/office/powerpoint/2010/main" val="2977655082"/>
+                <p14:modId xmlns:p14="http://schemas.microsoft.com/office/powerpoint/2010/main" val="4118306007"/>
               </p:ext>
             </p:extLst>
           </p:nvPr>
         </p:nvGraphicFramePr>
         <p:xfrm>
-          <a:off x="1074683" y="1852182"/>
-          <a:ext cx="10042634" cy="4023360"/>
+          <a:off x="1074683" y="1613733"/>
+          <a:ext cx="10042634" cy="4107660"/>
         </p:xfrm>
         <a:graphic>
           <a:graphicData uri="http://schemas.openxmlformats.org/drawingml/2006/table">
@@ -5168,8 +5649,8 @@
                     <a:lstStyle/>
                     <a:p>
                       <a:r>
-                        <a:rPr lang="en-US" dirty="0"/>
-                        <a:t>A premium version of the app </a:t>
+                        <a:rPr lang="en-US" sz="1100" dirty="0"/>
+                        <a:t>Barriers to using the app</a:t>
                       </a:r>
                     </a:p>
                   </a:txBody>
@@ -5181,9 +5662,14 @@
                     <a:lstStyle/>
                     <a:p>
                       <a:r>
-                        <a:rPr lang="en-US" dirty="0"/>
-                        <a:t>You want to encourage as many people as possible, by putting limitations on certain aspects of the app you're only pushing away more users</a:t>
+                        <a:rPr lang="en-US" sz="1100" dirty="0"/>
+                        <a:t>You want to encourage as many people as possible, by putting limitations on certain aspects of the app you're only pushing away more users, a sign-up function can allow for more targeted content, but it shouldn’t stop people from using the app, the goal is to educate as many students as possible since many stated information was hard to come across, </a:t>
                       </a:r>
+                      <a:r>
+                        <a:rPr lang="en-GB" sz="1100" dirty="0"/>
+                        <a:t>"unless you’re actively looking for it , you won't find anything about it… If I knew more about it, I don’t really know much about as I haven’t really been told about it, so if I got more information probably“. You don’t want this information hidden behind barriers. </a:t>
+                      </a:r>
+                      <a:endParaRPr lang="en-US" sz="1100" dirty="0"/>
                     </a:p>
                   </a:txBody>
                   <a:tcPr/>
@@ -5194,15 +5680,15 @@
                   </a:ext>
                 </a:extLst>
               </a:tr>
-              <a:tr h="883841">
+              <a:tr h="558786">
                 <a:tc>
                   <a:txBody>
                     <a:bodyPr/>
                     <a:lstStyle/>
                     <a:p>
                       <a:r>
-                        <a:rPr lang="en-US" dirty="0"/>
-                        <a:t>Any discouragement or inconsiderate features</a:t>
+                        <a:rPr lang="en-US" sz="1100" dirty="0"/>
+                        <a:t>Negative feedback to users</a:t>
                       </a:r>
                     </a:p>
                   </a:txBody>
@@ -5214,8 +5700,8 @@
                     <a:lstStyle/>
                     <a:p>
                       <a:r>
-                        <a:rPr lang="en-US" dirty="0"/>
-                        <a:t>Some users may want features hidden such as the mention of calories due to negative affects on their mental health</a:t>
+                        <a:rPr lang="en-US" sz="1100" dirty="0"/>
+                        <a:t>There should be no reason for a user to feel shame or confused when using the app, a user should feel enlightened, educated and more willing to learn about sustainability.</a:t>
                       </a:r>
                     </a:p>
                   </a:txBody>
@@ -5227,16 +5713,21 @@
                   </a:ext>
                 </a:extLst>
               </a:tr>
-              <a:tr h="883841">
+              <a:tr h="653274">
                 <a:tc>
                   <a:txBody>
                     <a:bodyPr/>
                     <a:lstStyle/>
                     <a:p>
                       <a:r>
-                        <a:rPr lang="en-US" dirty="0"/>
-                        <a:t>Too much information</a:t>
+                        <a:rPr lang="en-US" sz="1100" dirty="0"/>
+                        <a:t>Overload </a:t>
                       </a:r>
+                      <a:r>
+                        <a:rPr lang="en-US" sz="1100"/>
+                        <a:t>of information</a:t>
+                      </a:r>
+                      <a:endParaRPr lang="en-US" sz="1100" dirty="0"/>
                     </a:p>
                   </a:txBody>
                   <a:tcPr/>
@@ -5247,8 +5738,8 @@
                     <a:lstStyle/>
                     <a:p>
                       <a:r>
-                        <a:rPr lang="en-US" dirty="0"/>
-                        <a:t>Information should be simple and concise; many users have been unaware about this and want a quick answer to their question to get involved</a:t>
+                        <a:rPr lang="en-US" sz="1100" dirty="0"/>
+                        <a:t>Information should be simple and concise; many users have been unaware about this and want a quick answer to their question to get involved, you don’t want a user to feel belittled or bad about themselves for not knowing the information sooner.</a:t>
                       </a:r>
                     </a:p>
                   </a:txBody>
@@ -5267,7 +5758,7 @@
                     <a:lstStyle/>
                     <a:p>
                       <a:r>
-                        <a:rPr lang="en-US" dirty="0"/>
+                        <a:rPr lang="en-US" sz="1100" dirty="0"/>
                         <a:t>Discrimination of finance </a:t>
                       </a:r>
                     </a:p>
@@ -5280,8 +5771,8 @@
                     <a:lstStyle/>
                     <a:p>
                       <a:r>
-                        <a:rPr lang="en-US" dirty="0"/>
-                        <a:t>Many students don’t have much money but not all, sustainable food should be encouraged for all, there should be an inclusion for every financial group</a:t>
+                        <a:rPr lang="en-US" sz="1100" dirty="0"/>
+                        <a:t>Many students don’t have much money but not all, sustainable food should be encouraged for all, there should be an inclusion for every financial group, this can be achieved through a shop database telling users various prices of items in different shops. This can allow users to decide their most effective place for shopping rather than being pushed towards one. Many of the participants stated, if they had “infinite” money or “more money” they would welcome sustainable eating, therefore sharing the information of various shops can help students budget and improve their sustainable eating choices.</a:t>
                       </a:r>
                     </a:p>
                   </a:txBody>
@@ -5416,14 +5907,14 @@
           <p:nvPr>
             <p:extLst>
               <p:ext uri="{D42A27DB-BD31-4B8C-83A1-F6EECF244321}">
-                <p14:modId xmlns:p14="http://schemas.microsoft.com/office/powerpoint/2010/main" val="614431130"/>
+                <p14:modId xmlns:p14="http://schemas.microsoft.com/office/powerpoint/2010/main" val="4160699140"/>
               </p:ext>
             </p:extLst>
           </p:nvPr>
         </p:nvGraphicFramePr>
         <p:xfrm>
           <a:off x="827689" y="1172354"/>
-          <a:ext cx="10536621" cy="5276706"/>
+          <a:ext cx="10536621" cy="4804664"/>
         </p:xfrm>
         <a:graphic>
           <a:graphicData uri="http://schemas.openxmlformats.org/drawingml/2006/table">
@@ -5511,8 +6002,8 @@
                     <a:lstStyle/>
                     <a:p>
                       <a:r>
-                        <a:rPr lang="en-US" dirty="0"/>
-                        <a:t>Scroll feature</a:t>
+                        <a:rPr lang="en-US" sz="1100" dirty="0"/>
+                        <a:t>Intuitive navigation</a:t>
                       </a:r>
                     </a:p>
                   </a:txBody>
@@ -5524,16 +6015,16 @@
                     <a:lstStyle/>
                     <a:p>
                       <a:r>
-                        <a:rPr lang="en-US" dirty="0"/>
-                        <a:t>Many of the </a:t>
+                        <a:rPr lang="en-US" sz="1100" dirty="0"/>
+                        <a:t>Instagram being one of the </a:t>
                       </a:r>
                       <a:r>
-                        <a:rPr lang="en-US" dirty="0" err="1"/>
+                        <a:rPr lang="en-US" sz="1100" dirty="0" err="1"/>
                         <a:t>favourite</a:t>
                       </a:r>
                       <a:r>
-                        <a:rPr lang="en-US" dirty="0"/>
-                        <a:t> apps suggested by people involved a scroll feature to navigate the app</a:t>
+                        <a:rPr lang="en-US" sz="1100" dirty="0"/>
+                        <a:t> app is built around this idea of a intuitive navigation, its easy and can keep many entertained, something as simple as a scroll or swipe can help users understand the app a lot easier.</a:t>
                       </a:r>
                     </a:p>
                   </a:txBody>
@@ -5545,8 +6036,8 @@
                     <a:lstStyle/>
                     <a:p>
                       <a:r>
-                        <a:rPr lang="en-US" dirty="0"/>
-                        <a:t>Mid</a:t>
+                        <a:rPr lang="en-US" sz="1100" dirty="0"/>
+                        <a:t>Mid/Low</a:t>
                       </a:r>
                     </a:p>
                   </a:txBody>
@@ -5565,8 +6056,8 @@
                     <a:lstStyle/>
                     <a:p>
                       <a:r>
-                        <a:rPr lang="en-US" dirty="0"/>
-                        <a:t>Mention of calories </a:t>
+                        <a:rPr lang="en-US" sz="1100" dirty="0"/>
+                        <a:t>Food benefits &amp; information</a:t>
                       </a:r>
                     </a:p>
                   </a:txBody>
@@ -5578,9 +6069,18 @@
                     <a:lstStyle/>
                     <a:p>
                       <a:r>
-                        <a:rPr lang="en-US" dirty="0"/>
-                        <a:t>This can help people to eat healthier while possibly helping with mental health – need to make sure to give an option of hiding calories</a:t>
+                        <a:rPr lang="en-US" sz="1100" dirty="0"/>
+                        <a:t>If you help people understand the meaning and importance of sustainable eating it could encourage people to do it more often, for example participant B stated, “</a:t>
                       </a:r>
+                      <a:r>
+                        <a:rPr lang="en-US" sz="1100" dirty="0" err="1"/>
+                        <a:t>i</a:t>
+                      </a:r>
+                      <a:r>
+                        <a:rPr lang="en-GB" sz="1100" dirty="0"/>
+                        <a:t>f I knew more about it, I don’t really know much about as I haven’t really been told about it”. They’re definitely not the only person in this position and therefore it is important to educate people on the matter.</a:t>
+                      </a:r>
+                      <a:endParaRPr lang="en-US" sz="1100" dirty="0"/>
                     </a:p>
                   </a:txBody>
                   <a:tcPr/>
@@ -5591,7 +6091,7 @@
                     <a:lstStyle/>
                     <a:p>
                       <a:r>
-                        <a:rPr lang="en-US" dirty="0"/>
+                        <a:rPr lang="en-US" sz="1100" dirty="0"/>
                         <a:t>High</a:t>
                       </a:r>
                     </a:p>
@@ -5611,7 +6111,7 @@
                     <a:lstStyle/>
                     <a:p>
                       <a:r>
-                        <a:rPr lang="en-US" dirty="0"/>
+                        <a:rPr lang="en-US" sz="1100" dirty="0"/>
                         <a:t>Photo reel/feed</a:t>
                       </a:r>
                     </a:p>
@@ -5624,8 +6124,16 @@
                     <a:lstStyle/>
                     <a:p>
                       <a:r>
-                        <a:rPr lang="en-US" dirty="0"/>
-                        <a:t>Demonstrate different recipes in a feed like Instagram</a:t>
+                        <a:rPr lang="en-US" sz="1100" dirty="0"/>
+                        <a:t>Many of my participants stated Instagram to be their </a:t>
+                      </a:r>
+                      <a:r>
+                        <a:rPr lang="en-US" sz="1100" dirty="0" err="1"/>
+                        <a:t>favourite</a:t>
+                      </a:r>
+                      <a:r>
+                        <a:rPr lang="en-US" sz="1100" dirty="0"/>
+                        <a:t> app, this implied it was crucial to have a similar feature and the most iconic is the Instagram feed. This can be incorporated into the app as means of building a community and allow people to showcase different recipes to one another. This would help push the agenda of eating more sustainably when looking at what others are doing.</a:t>
                       </a:r>
                     </a:p>
                   </a:txBody>
@@ -5637,8 +6145,8 @@
                     <a:lstStyle/>
                     <a:p>
                       <a:r>
-                        <a:rPr lang="en-US" dirty="0"/>
-                        <a:t>Mid</a:t>
+                        <a:rPr lang="en-US" sz="1100" dirty="0"/>
+                        <a:t>High</a:t>
                       </a:r>
                     </a:p>
                   </a:txBody>
@@ -5657,7 +6165,7 @@
                     <a:lstStyle/>
                     <a:p>
                       <a:r>
-                        <a:rPr lang="en-US" dirty="0"/>
+                        <a:rPr lang="en-US" sz="1100" dirty="0"/>
                         <a:t>Fun/collaborative</a:t>
                       </a:r>
                     </a:p>
@@ -5670,16 +6178,22 @@
                     <a:lstStyle/>
                     <a:p>
                       <a:r>
-                        <a:rPr lang="en-US" dirty="0"/>
+                        <a:rPr lang="en-US" sz="1100" dirty="0"/>
                         <a:t>One of my participants had a game as their </a:t>
                       </a:r>
                       <a:r>
-                        <a:rPr lang="en-US" dirty="0" err="1"/>
+                        <a:rPr lang="en-US" sz="1100" dirty="0" err="1"/>
                         <a:t>favourite</a:t>
                       </a:r>
                       <a:r>
-                        <a:rPr lang="en-US" dirty="0"/>
-                        <a:t> app, this could be a fun and more interesting approach to teaching/helping people to eat sustainably</a:t>
+                        <a:rPr lang="en-US" sz="1100" dirty="0"/>
+                        <a:t> app, this could be a fun and more interesting approach to teaching/helping people to eat sustainably, small mini games to help educate people or a login bonus everyday which eventually add up to a reward of some sort. </a:t>
+                      </a:r>
+                    </a:p>
+                    <a:p>
+                      <a:r>
+                        <a:rPr lang="en-US" sz="1100" dirty="0"/>
+                        <a:t>The mini games included can help educate people on different areas of sustainability such as food miles or fair trade.</a:t>
                       </a:r>
                     </a:p>
                   </a:txBody>
@@ -5691,7 +6205,7 @@
                     <a:lstStyle/>
                     <a:p>
                       <a:r>
-                        <a:rPr lang="en-US" dirty="0"/>
+                        <a:rPr lang="en-US" sz="1100" dirty="0"/>
                         <a:t>Low</a:t>
                       </a:r>
                     </a:p>
@@ -5711,7 +6225,7 @@
                     <a:lstStyle/>
                     <a:p>
                       <a:r>
-                        <a:rPr lang="en-US" dirty="0"/>
+                        <a:rPr lang="en-US" sz="1100" dirty="0"/>
                         <a:t>Praise system</a:t>
                       </a:r>
                     </a:p>
@@ -5724,8 +6238,8 @@
                     <a:lstStyle/>
                     <a:p>
                       <a:r>
-                        <a:rPr lang="en-US" dirty="0"/>
-                        <a:t>You don’t want people to feel negative about what they do, positive reinforcement is one of the best ways to elevate mental health</a:t>
+                        <a:rPr lang="en-US" sz="1100" dirty="0"/>
+                        <a:t>Many of my participants appreciated when apps made them feel good or positive about themselves, this can be easily incorporated with achieving set goals or little messages when using the app. A main one would be the inclusion of highlighting sustainable food and when used for a meal make the user feel a sense of achievement.</a:t>
                       </a:r>
                     </a:p>
                   </a:txBody>
@@ -5737,7 +6251,7 @@
                     <a:lstStyle/>
                     <a:p>
                       <a:r>
-                        <a:rPr lang="en-US" dirty="0"/>
+                        <a:rPr lang="en-US" sz="1100" dirty="0"/>
                         <a:t>High</a:t>
                       </a:r>
                     </a:p>
@@ -5757,8 +6271,8 @@
                     <a:lstStyle/>
                     <a:p>
                       <a:r>
-                        <a:rPr lang="en-US" dirty="0"/>
-                        <a:t>Folders</a:t>
+                        <a:rPr lang="en-US" sz="1100" dirty="0"/>
+                        <a:t>Controlled organization</a:t>
                       </a:r>
                     </a:p>
                   </a:txBody>
@@ -5770,8 +6284,16 @@
                     <a:lstStyle/>
                     <a:p>
                       <a:r>
-                        <a:rPr lang="en-US" dirty="0"/>
-                        <a:t>Participant F liked Spotify the most which has a very good user-controlled organization function, this could help uses categories and push them to save meals they enjoy into folders and make their life easy as well as hopefully bring them back to the app.</a:t>
+                        <a:rPr lang="en-US" sz="1100" dirty="0"/>
+                        <a:t>Participant F liked Spotify the most which has a very good user-controlled organization function, this could help uses navigate and </a:t>
+                      </a:r>
+                      <a:r>
+                        <a:rPr lang="en-US" sz="1100" dirty="0" err="1"/>
+                        <a:t>favourite</a:t>
+                      </a:r>
+                      <a:r>
+                        <a:rPr lang="en-US" sz="1100" dirty="0"/>
+                        <a:t> their most liked dishes. User organization can come in many forms from customizing the layout of the app to the inclusion of folders, its imperative that users have a say in the app as they will feel more in control and therefore earn a feeling of success when achieving a sustainable food choice.</a:t>
                       </a:r>
                     </a:p>
                   </a:txBody>
@@ -5783,8 +6305,8 @@
                     <a:lstStyle/>
                     <a:p>
                       <a:r>
-                        <a:rPr lang="en-US" dirty="0"/>
-                        <a:t>Mid/high</a:t>
+                        <a:rPr lang="en-US" sz="1100" dirty="0"/>
+                        <a:t>Mid</a:t>
                       </a:r>
                     </a:p>
                   </a:txBody>

</xml_diff>